<commit_message>
updated the code for robot and monitoring sys
</commit_message>
<xml_diff>
--- a/src/First ppt.pptx
+++ b/src/First ppt.pptx
@@ -3975,13 +3975,13 @@
       </p:sp>
       <p:sp>
         <p:nvSpPr>
-          <p:cNvPr id="7" name="Rounded Rectangle 6"/>
+          <p:cNvPr id="8" name="Rounded Rectangle 7"/>
           <p:cNvSpPr/>
           <p:nvPr/>
         </p:nvSpPr>
         <p:spPr>
           <a:xfrm>
-            <a:off x="1176020" y="2946400"/>
+            <a:off x="3600450" y="4526280"/>
             <a:ext cx="1450975" cy="535940"/>
           </a:xfrm>
           <a:prstGeom prst="roundRect">
@@ -4015,13 +4015,13 @@
       </p:sp>
       <p:sp>
         <p:nvSpPr>
-          <p:cNvPr id="8" name="Rounded Rectangle 7"/>
+          <p:cNvPr id="9" name="Rounded Rectangle 8"/>
           <p:cNvSpPr/>
           <p:nvPr/>
         </p:nvSpPr>
         <p:spPr>
           <a:xfrm>
-            <a:off x="3600450" y="4526280"/>
+            <a:off x="3600450" y="5677535"/>
             <a:ext cx="1450975" cy="535940"/>
           </a:xfrm>
           <a:prstGeom prst="roundRect">
@@ -4055,13 +4055,13 @@
       </p:sp>
       <p:sp>
         <p:nvSpPr>
-          <p:cNvPr id="9" name="Rounded Rectangle 8"/>
+          <p:cNvPr id="10" name="Rounded Rectangle 9"/>
           <p:cNvSpPr/>
           <p:nvPr/>
         </p:nvSpPr>
         <p:spPr>
           <a:xfrm>
-            <a:off x="3600450" y="5677535"/>
+            <a:off x="6024880" y="2946400"/>
             <a:ext cx="1450975" cy="535940"/>
           </a:xfrm>
           <a:prstGeom prst="roundRect">
@@ -4095,13 +4095,13 @@
       </p:sp>
       <p:sp>
         <p:nvSpPr>
-          <p:cNvPr id="10" name="Rounded Rectangle 9"/>
+          <p:cNvPr id="12" name="Rounded Rectangle 11"/>
           <p:cNvSpPr/>
           <p:nvPr/>
         </p:nvSpPr>
         <p:spPr>
           <a:xfrm>
-            <a:off x="6024880" y="2946400"/>
+            <a:off x="8551545" y="4098290"/>
             <a:ext cx="1450975" cy="535940"/>
           </a:xfrm>
           <a:prstGeom prst="roundRect">
@@ -4135,14 +4135,14 @@
       </p:sp>
       <p:sp>
         <p:nvSpPr>
-          <p:cNvPr id="11" name="Rounded Rectangle 10"/>
+          <p:cNvPr id="13" name="Rounded Rectangle 12"/>
           <p:cNvSpPr/>
           <p:nvPr/>
         </p:nvSpPr>
         <p:spPr>
           <a:xfrm>
-            <a:off x="6024880" y="3910965"/>
-            <a:ext cx="1450975" cy="535940"/>
+            <a:off x="8550910" y="2946400"/>
+            <a:ext cx="1403350" cy="730885"/>
           </a:xfrm>
           <a:prstGeom prst="roundRect">
             <a:avLst/>
@@ -4175,13 +4175,13 @@
       </p:sp>
       <p:sp>
         <p:nvSpPr>
-          <p:cNvPr id="12" name="Rounded Rectangle 11"/>
+          <p:cNvPr id="14" name="Rounded Rectangle 13"/>
           <p:cNvSpPr/>
           <p:nvPr/>
         </p:nvSpPr>
         <p:spPr>
           <a:xfrm>
-            <a:off x="8625205" y="4051300"/>
+            <a:off x="8561070" y="2036445"/>
             <a:ext cx="1450975" cy="535940"/>
           </a:xfrm>
           <a:prstGeom prst="roundRect">
@@ -4215,93 +4215,13 @@
       </p:sp>
       <p:sp>
         <p:nvSpPr>
-          <p:cNvPr id="13" name="Rounded Rectangle 12"/>
-          <p:cNvSpPr/>
-          <p:nvPr/>
-        </p:nvSpPr>
-        <p:spPr>
-          <a:xfrm>
-            <a:off x="8746490" y="2946400"/>
-            <a:ext cx="1207770" cy="730885"/>
-          </a:xfrm>
-          <a:prstGeom prst="roundRect">
-            <a:avLst/>
-          </a:prstGeom>
-          <a:noFill/>
-        </p:spPr>
-        <p:style>
-          <a:lnRef idx="2">
-            <a:schemeClr val="accent1">
-              <a:shade val="50000"/>
-            </a:schemeClr>
-          </a:lnRef>
-          <a:fillRef idx="1">
-            <a:schemeClr val="accent1"/>
-          </a:fillRef>
-          <a:effectRef idx="0">
-            <a:schemeClr val="accent1"/>
-          </a:effectRef>
-          <a:fontRef idx="minor">
-            <a:schemeClr val="lt1"/>
-          </a:fontRef>
-        </p:style>
-        <p:txBody>
-          <a:bodyPr rtlCol="0" anchor="ctr"/>
-          <a:p>
-            <a:pPr algn="ctr"/>
-            <a:endParaRPr lang="en-US"/>
-          </a:p>
-        </p:txBody>
-      </p:sp>
-      <p:sp>
-        <p:nvSpPr>
-          <p:cNvPr id="14" name="Rounded Rectangle 13"/>
-          <p:cNvSpPr/>
-          <p:nvPr/>
-        </p:nvSpPr>
-        <p:spPr>
-          <a:xfrm>
-            <a:off x="8624570" y="2036445"/>
-            <a:ext cx="1450975" cy="535940"/>
-          </a:xfrm>
-          <a:prstGeom prst="roundRect">
-            <a:avLst/>
-          </a:prstGeom>
-          <a:noFill/>
-        </p:spPr>
-        <p:style>
-          <a:lnRef idx="2">
-            <a:schemeClr val="accent1">
-              <a:shade val="50000"/>
-            </a:schemeClr>
-          </a:lnRef>
-          <a:fillRef idx="1">
-            <a:schemeClr val="accent1"/>
-          </a:fillRef>
-          <a:effectRef idx="0">
-            <a:schemeClr val="accent1"/>
-          </a:effectRef>
-          <a:fontRef idx="minor">
-            <a:schemeClr val="lt1"/>
-          </a:fontRef>
-        </p:style>
-        <p:txBody>
-          <a:bodyPr rtlCol="0" anchor="ctr"/>
-          <a:p>
-            <a:pPr algn="ctr"/>
-            <a:endParaRPr lang="en-US"/>
-          </a:p>
-        </p:txBody>
-      </p:sp>
-      <p:sp>
-        <p:nvSpPr>
           <p:cNvPr id="15" name="Rounded Rectangle 14"/>
           <p:cNvSpPr/>
           <p:nvPr/>
         </p:nvSpPr>
         <p:spPr>
           <a:xfrm>
-            <a:off x="8625205" y="4961890"/>
+            <a:off x="8551545" y="5008880"/>
             <a:ext cx="1450975" cy="535940"/>
           </a:xfrm>
           <a:prstGeom prst="roundRect">
@@ -4557,8 +4477,8 @@
         </p:nvCxnSpPr>
         <p:spPr>
           <a:xfrm>
-            <a:off x="9350375" y="3677285"/>
-            <a:ext cx="635" cy="374015"/>
+            <a:off x="9252585" y="3677285"/>
+            <a:ext cx="24765" cy="421005"/>
           </a:xfrm>
           <a:prstGeom prst="straightConnector1">
             <a:avLst/>
@@ -4593,13 +4513,558 @@
         </p:nvCxnSpPr>
         <p:spPr>
           <a:xfrm>
-            <a:off x="9351010" y="4587240"/>
+            <a:off x="9277350" y="4634230"/>
             <a:ext cx="0" cy="374650"/>
           </a:xfrm>
           <a:prstGeom prst="straightConnector1">
             <a:avLst/>
           </a:prstGeom>
           <a:ln>
+            <a:tailEnd type="arrow" w="med" len="med"/>
+          </a:ln>
+        </p:spPr>
+        <p:style>
+          <a:lnRef idx="3">
+            <a:schemeClr val="accent4"/>
+          </a:lnRef>
+          <a:fillRef idx="0">
+            <a:schemeClr val="accent4"/>
+          </a:fillRef>
+          <a:effectRef idx="2">
+            <a:schemeClr val="accent4"/>
+          </a:effectRef>
+          <a:fontRef idx="minor">
+            <a:schemeClr val="tx1"/>
+          </a:fontRef>
+        </p:style>
+      </p:cxnSp>
+      <p:sp>
+        <p:nvSpPr>
+          <p:cNvPr id="29" name="Text Box 28"/>
+          <p:cNvSpPr txBox="1"/>
+          <p:nvPr/>
+        </p:nvSpPr>
+        <p:spPr>
+          <a:xfrm>
+            <a:off x="2110740" y="1826260"/>
+            <a:ext cx="1344295" cy="583565"/>
+          </a:xfrm>
+          <a:prstGeom prst="rect">
+            <a:avLst/>
+          </a:prstGeom>
+          <a:noFill/>
+        </p:spPr>
+        <p:txBody>
+          <a:bodyPr wrap="square" rtlCol="0">
+            <a:spAutoFit/>
+          </a:bodyPr>
+          <a:p>
+            <a:r>
+              <a:rPr lang="en-GB" altLang="en-US" sz="1600"/>
+              <a:t>Moisture</a:t>
+            </a:r>
+            <a:endParaRPr lang="en-GB" altLang="en-US" sz="1600"/>
+          </a:p>
+          <a:p>
+            <a:r>
+              <a:rPr lang="en-GB" altLang="en-US" sz="1600"/>
+              <a:t>sensor</a:t>
+            </a:r>
+            <a:endParaRPr lang="en-GB" altLang="en-US" sz="1600"/>
+          </a:p>
+        </p:txBody>
+      </p:sp>
+      <p:sp>
+        <p:nvSpPr>
+          <p:cNvPr id="30" name="Text Box 29"/>
+          <p:cNvSpPr txBox="1"/>
+          <p:nvPr/>
+        </p:nvSpPr>
+        <p:spPr>
+          <a:xfrm>
+            <a:off x="3552190" y="1767840"/>
+            <a:ext cx="1762125" cy="521970"/>
+          </a:xfrm>
+          <a:prstGeom prst="rect">
+            <a:avLst/>
+          </a:prstGeom>
+          <a:noFill/>
+        </p:spPr>
+        <p:txBody>
+          <a:bodyPr wrap="square" rtlCol="0">
+            <a:spAutoFit/>
+          </a:bodyPr>
+          <a:p>
+            <a:r>
+              <a:rPr lang="en-GB" altLang="en-US" sz="1400"/>
+              <a:t>Temp &amp; Humidity sensor</a:t>
+            </a:r>
+            <a:endParaRPr lang="en-GB" altLang="en-US" sz="1400"/>
+          </a:p>
+        </p:txBody>
+      </p:sp>
+      <p:sp>
+        <p:nvSpPr>
+          <p:cNvPr id="31" name="Text Box 30"/>
+          <p:cNvSpPr txBox="1"/>
+          <p:nvPr/>
+        </p:nvSpPr>
+        <p:spPr>
+          <a:xfrm>
+            <a:off x="5357495" y="1910080"/>
+            <a:ext cx="1363980" cy="337185"/>
+          </a:xfrm>
+          <a:prstGeom prst="rect">
+            <a:avLst/>
+          </a:prstGeom>
+          <a:noFill/>
+        </p:spPr>
+        <p:txBody>
+          <a:bodyPr wrap="square" rtlCol="0">
+            <a:spAutoFit/>
+          </a:bodyPr>
+          <a:p>
+            <a:r>
+              <a:rPr lang="en-GB" altLang="en-US" sz="1600"/>
+              <a:t>Light sensor</a:t>
+            </a:r>
+            <a:endParaRPr lang="en-GB" altLang="en-US" sz="1600"/>
+          </a:p>
+        </p:txBody>
+      </p:sp>
+      <p:sp>
+        <p:nvSpPr>
+          <p:cNvPr id="32" name="Text Box 31"/>
+          <p:cNvSpPr txBox="1"/>
+          <p:nvPr/>
+        </p:nvSpPr>
+        <p:spPr>
+          <a:xfrm>
+            <a:off x="6190615" y="3042920"/>
+            <a:ext cx="1421765" cy="337185"/>
+          </a:xfrm>
+          <a:prstGeom prst="rect">
+            <a:avLst/>
+          </a:prstGeom>
+          <a:noFill/>
+        </p:spPr>
+        <p:txBody>
+          <a:bodyPr wrap="square" rtlCol="0">
+            <a:spAutoFit/>
+          </a:bodyPr>
+          <a:p>
+            <a:r>
+              <a:rPr lang="en-GB" altLang="en-US" sz="1600"/>
+              <a:t>Camera</a:t>
+            </a:r>
+            <a:endParaRPr lang="en-GB" altLang="en-US" sz="1600"/>
+          </a:p>
+        </p:txBody>
+      </p:sp>
+      <p:sp>
+        <p:nvSpPr>
+          <p:cNvPr id="34" name="Text Box 33"/>
+          <p:cNvSpPr txBox="1"/>
+          <p:nvPr/>
+        </p:nvSpPr>
+        <p:spPr>
+          <a:xfrm>
+            <a:off x="3735705" y="4502150"/>
+            <a:ext cx="1315720" cy="583565"/>
+          </a:xfrm>
+          <a:prstGeom prst="rect">
+            <a:avLst/>
+          </a:prstGeom>
+          <a:noFill/>
+        </p:spPr>
+        <p:txBody>
+          <a:bodyPr wrap="square" rtlCol="0">
+            <a:spAutoFit/>
+          </a:bodyPr>
+          <a:p>
+            <a:r>
+              <a:rPr lang="en-GB" altLang="en-US" sz="1600"/>
+              <a:t>Motor controller</a:t>
+            </a:r>
+            <a:endParaRPr lang="en-GB" altLang="en-US" sz="1600"/>
+          </a:p>
+        </p:txBody>
+      </p:sp>
+      <p:sp>
+        <p:nvSpPr>
+          <p:cNvPr id="35" name="Text Box 34"/>
+          <p:cNvSpPr txBox="1"/>
+          <p:nvPr/>
+        </p:nvSpPr>
+        <p:spPr>
+          <a:xfrm>
+            <a:off x="3814445" y="5776595"/>
+            <a:ext cx="1460500" cy="337185"/>
+          </a:xfrm>
+          <a:prstGeom prst="rect">
+            <a:avLst/>
+          </a:prstGeom>
+          <a:noFill/>
+        </p:spPr>
+        <p:txBody>
+          <a:bodyPr wrap="square" rtlCol="0">
+            <a:spAutoFit/>
+          </a:bodyPr>
+          <a:p>
+            <a:r>
+              <a:rPr lang="en-GB" altLang="en-US" sz="1600"/>
+              <a:t>Motors</a:t>
+            </a:r>
+            <a:endParaRPr lang="en-GB" altLang="en-US" sz="1600"/>
+          </a:p>
+        </p:txBody>
+      </p:sp>
+      <p:sp>
+        <p:nvSpPr>
+          <p:cNvPr id="36" name="Text Box 35"/>
+          <p:cNvSpPr txBox="1"/>
+          <p:nvPr/>
+        </p:nvSpPr>
+        <p:spPr>
+          <a:xfrm>
+            <a:off x="3751580" y="3042920"/>
+            <a:ext cx="1363345" cy="1198880"/>
+          </a:xfrm>
+          <a:prstGeom prst="rect">
+            <a:avLst/>
+          </a:prstGeom>
+          <a:noFill/>
+        </p:spPr>
+        <p:txBody>
+          <a:bodyPr wrap="square" rtlCol="0">
+            <a:spAutoFit/>
+          </a:bodyPr>
+          <a:p>
+            <a:r>
+              <a:rPr lang="en-GB" altLang="en-US" sz="2400">
+                <a:sym typeface="+mn-ea"/>
+              </a:rPr>
+              <a:t>ESP Module</a:t>
+            </a:r>
+            <a:endParaRPr lang="en-GB" altLang="en-US" sz="2400"/>
+          </a:p>
+          <a:p>
+            <a:endParaRPr lang="en-GB" altLang="en-US" sz="2400">
+              <a:latin typeface="Arial" panose="020B0604020202020204" pitchFamily="34" charset="0"/>
+              <a:cs typeface="Arial" panose="020B0604020202020204" pitchFamily="34" charset="0"/>
+            </a:endParaRPr>
+          </a:p>
+        </p:txBody>
+      </p:sp>
+      <p:sp>
+        <p:nvSpPr>
+          <p:cNvPr id="41" name="Text Box 40"/>
+          <p:cNvSpPr txBox="1"/>
+          <p:nvPr/>
+        </p:nvSpPr>
+        <p:spPr>
+          <a:xfrm>
+            <a:off x="8742045" y="2035810"/>
+            <a:ext cx="1217295" cy="583565"/>
+          </a:xfrm>
+          <a:prstGeom prst="rect">
+            <a:avLst/>
+          </a:prstGeom>
+          <a:noFill/>
+        </p:spPr>
+        <p:txBody>
+          <a:bodyPr wrap="square" rtlCol="0">
+            <a:spAutoFit/>
+          </a:bodyPr>
+          <a:p>
+            <a:r>
+              <a:rPr lang="en-GB" altLang="en-US" sz="1600"/>
+              <a:t>Exhaust Fan</a:t>
+            </a:r>
+            <a:endParaRPr lang="en-GB" altLang="en-US" sz="1600"/>
+          </a:p>
+        </p:txBody>
+      </p:sp>
+      <p:sp>
+        <p:nvSpPr>
+          <p:cNvPr id="43" name="Text Box 42"/>
+          <p:cNvSpPr txBox="1"/>
+          <p:nvPr/>
+        </p:nvSpPr>
+        <p:spPr>
+          <a:xfrm>
+            <a:off x="8550910" y="3106420"/>
+            <a:ext cx="1480820" cy="460375"/>
+          </a:xfrm>
+          <a:prstGeom prst="rect">
+            <a:avLst/>
+          </a:prstGeom>
+          <a:noFill/>
+        </p:spPr>
+        <p:txBody>
+          <a:bodyPr wrap="square" rtlCol="0">
+            <a:spAutoFit/>
+          </a:bodyPr>
+          <a:p>
+            <a:r>
+              <a:rPr lang="en-GB" altLang="en-US" sz="2400">
+                <a:latin typeface="Arial" panose="020B0604020202020204" pitchFamily="34" charset="0"/>
+                <a:cs typeface="Arial" panose="020B0604020202020204" pitchFamily="34" charset="0"/>
+              </a:rPr>
+              <a:t>ESP8266</a:t>
+            </a:r>
+            <a:endParaRPr lang="en-GB" altLang="en-US" sz="2400">
+              <a:latin typeface="Arial" panose="020B0604020202020204" pitchFamily="34" charset="0"/>
+              <a:cs typeface="Arial" panose="020B0604020202020204" pitchFamily="34" charset="0"/>
+            </a:endParaRPr>
+          </a:p>
+        </p:txBody>
+      </p:sp>
+      <p:sp>
+        <p:nvSpPr>
+          <p:cNvPr id="44" name="Text Box 43"/>
+          <p:cNvSpPr txBox="1"/>
+          <p:nvPr/>
+        </p:nvSpPr>
+        <p:spPr>
+          <a:xfrm>
+            <a:off x="8590280" y="4161790"/>
+            <a:ext cx="1421765" cy="337185"/>
+          </a:xfrm>
+          <a:prstGeom prst="rect">
+            <a:avLst/>
+          </a:prstGeom>
+          <a:noFill/>
+        </p:spPr>
+        <p:txBody>
+          <a:bodyPr wrap="square" rtlCol="0">
+            <a:spAutoFit/>
+          </a:bodyPr>
+          <a:p>
+            <a:r>
+              <a:rPr lang="en-GB" altLang="en-US" sz="1600"/>
+              <a:t>Water pump</a:t>
+            </a:r>
+            <a:endParaRPr lang="en-GB" altLang="en-US" sz="1600"/>
+          </a:p>
+        </p:txBody>
+      </p:sp>
+      <p:sp>
+        <p:nvSpPr>
+          <p:cNvPr id="45" name="Text Box 44"/>
+          <p:cNvSpPr txBox="1"/>
+          <p:nvPr/>
+        </p:nvSpPr>
+        <p:spPr>
+          <a:xfrm>
+            <a:off x="8765540" y="5008880"/>
+            <a:ext cx="1412240" cy="583565"/>
+          </a:xfrm>
+          <a:prstGeom prst="rect">
+            <a:avLst/>
+          </a:prstGeom>
+          <a:noFill/>
+        </p:spPr>
+        <p:txBody>
+          <a:bodyPr wrap="square" rtlCol="0">
+            <a:spAutoFit/>
+          </a:bodyPr>
+          <a:p>
+            <a:r>
+              <a:rPr lang="en-GB" altLang="en-US" sz="1600"/>
+              <a:t>Irrigation System</a:t>
+            </a:r>
+            <a:endParaRPr lang="en-GB" altLang="en-US" sz="1600"/>
+          </a:p>
+        </p:txBody>
+      </p:sp>
+      <p:sp>
+        <p:nvSpPr>
+          <p:cNvPr id="38" name="Rounded Rectangle 37"/>
+          <p:cNvSpPr/>
+          <p:nvPr/>
+        </p:nvSpPr>
+        <p:spPr>
+          <a:xfrm>
+            <a:off x="1516380" y="4114800"/>
+            <a:ext cx="1450975" cy="535940"/>
+          </a:xfrm>
+          <a:prstGeom prst="roundRect">
+            <a:avLst/>
+          </a:prstGeom>
+          <a:noFill/>
+        </p:spPr>
+        <p:style>
+          <a:lnRef idx="2">
+            <a:schemeClr val="accent1">
+              <a:shade val="50000"/>
+            </a:schemeClr>
+          </a:lnRef>
+          <a:fillRef idx="1">
+            <a:schemeClr val="accent1"/>
+          </a:fillRef>
+          <a:effectRef idx="0">
+            <a:schemeClr val="accent1"/>
+          </a:effectRef>
+          <a:fontRef idx="minor">
+            <a:schemeClr val="lt1"/>
+          </a:fontRef>
+        </p:style>
+        <p:txBody>
+          <a:bodyPr rtlCol="0" anchor="ctr"/>
+          <a:p>
+            <a:pPr algn="ctr"/>
+            <a:endParaRPr lang="en-US"/>
+          </a:p>
+        </p:txBody>
+      </p:sp>
+      <p:sp>
+        <p:nvSpPr>
+          <p:cNvPr id="40" name="Text Box 39"/>
+          <p:cNvSpPr txBox="1"/>
+          <p:nvPr/>
+        </p:nvSpPr>
+        <p:spPr>
+          <a:xfrm>
+            <a:off x="1530985" y="4114800"/>
+            <a:ext cx="1421765" cy="583565"/>
+          </a:xfrm>
+          <a:prstGeom prst="rect">
+            <a:avLst/>
+          </a:prstGeom>
+          <a:noFill/>
+        </p:spPr>
+        <p:txBody>
+          <a:bodyPr wrap="square" rtlCol="0">
+            <a:spAutoFit/>
+          </a:bodyPr>
+          <a:p>
+            <a:r>
+              <a:rPr lang="en-GB" altLang="en-US" sz="1600"/>
+              <a:t>Robotic arm servo</a:t>
+            </a:r>
+            <a:endParaRPr lang="en-GB" altLang="en-US" sz="1600"/>
+          </a:p>
+        </p:txBody>
+      </p:sp>
+      <p:cxnSp>
+        <p:nvCxnSpPr>
+          <p:cNvPr id="47" name="Straight Arrow Connector 46"/>
+          <p:cNvCxnSpPr/>
+          <p:nvPr/>
+        </p:nvCxnSpPr>
+        <p:spPr>
+          <a:xfrm flipH="1">
+            <a:off x="2967355" y="3897630"/>
+            <a:ext cx="731520" cy="471170"/>
+          </a:xfrm>
+          <a:prstGeom prst="straightConnector1">
+            <a:avLst/>
+          </a:prstGeom>
+          <a:ln>
+            <a:tailEnd type="arrow" w="med" len="med"/>
+          </a:ln>
+        </p:spPr>
+        <p:style>
+          <a:lnRef idx="3">
+            <a:schemeClr val="accent4"/>
+          </a:lnRef>
+          <a:fillRef idx="0">
+            <a:schemeClr val="accent4"/>
+          </a:fillRef>
+          <a:effectRef idx="2">
+            <a:schemeClr val="accent4"/>
+          </a:effectRef>
+          <a:fontRef idx="minor">
+            <a:schemeClr val="tx1"/>
+          </a:fontRef>
+        </p:style>
+      </p:cxnSp>
+      <p:sp>
+        <p:nvSpPr>
+          <p:cNvPr id="49" name="Rounded Rectangle 48"/>
+          <p:cNvSpPr/>
+          <p:nvPr/>
+        </p:nvSpPr>
+        <p:spPr>
+          <a:xfrm>
+            <a:off x="1243330" y="3036570"/>
+            <a:ext cx="1450975" cy="535940"/>
+          </a:xfrm>
+          <a:prstGeom prst="roundRect">
+            <a:avLst/>
+          </a:prstGeom>
+          <a:noFill/>
+        </p:spPr>
+        <p:style>
+          <a:lnRef idx="2">
+            <a:schemeClr val="accent1">
+              <a:shade val="50000"/>
+            </a:schemeClr>
+          </a:lnRef>
+          <a:fillRef idx="1">
+            <a:schemeClr val="accent1"/>
+          </a:fillRef>
+          <a:effectRef idx="0">
+            <a:schemeClr val="accent1"/>
+          </a:effectRef>
+          <a:fontRef idx="minor">
+            <a:schemeClr val="lt1"/>
+          </a:fontRef>
+        </p:style>
+        <p:txBody>
+          <a:bodyPr rtlCol="0" anchor="ctr"/>
+          <a:p>
+            <a:pPr algn="ctr"/>
+            <a:endParaRPr lang="en-US"/>
+          </a:p>
+        </p:txBody>
+      </p:sp>
+      <p:sp>
+        <p:nvSpPr>
+          <p:cNvPr id="50" name="Text Box 49"/>
+          <p:cNvSpPr txBox="1"/>
+          <p:nvPr/>
+        </p:nvSpPr>
+        <p:spPr>
+          <a:xfrm>
+            <a:off x="1530985" y="3128010"/>
+            <a:ext cx="1315720" cy="368300"/>
+          </a:xfrm>
+          <a:prstGeom prst="rect">
+            <a:avLst/>
+          </a:prstGeom>
+          <a:noFill/>
+        </p:spPr>
+        <p:txBody>
+          <a:bodyPr wrap="square" rtlCol="0">
+            <a:spAutoFit/>
+          </a:bodyPr>
+          <a:p>
+            <a:r>
+              <a:rPr lang="en-GB" altLang="en-US" b="1"/>
+              <a:t>IOT</a:t>
+            </a:r>
+            <a:endParaRPr lang="en-GB" altLang="en-US" b="1"/>
+          </a:p>
+        </p:txBody>
+      </p:sp>
+      <p:cxnSp>
+        <p:nvCxnSpPr>
+          <p:cNvPr id="51" name="Straight Arrow Connector 50"/>
+          <p:cNvCxnSpPr/>
+          <p:nvPr/>
+        </p:nvCxnSpPr>
+        <p:spPr>
+          <a:xfrm flipH="1">
+            <a:off x="2694305" y="3286760"/>
+            <a:ext cx="584835" cy="0"/>
+          </a:xfrm>
+          <a:prstGeom prst="straightConnector1">
+            <a:avLst/>
+          </a:prstGeom>
+          <a:ln>
+            <a:headEnd type="arrow" w="med" len="med"/>
             <a:tailEnd type="arrow" w="med" len="med"/>
           </a:ln>
         </p:spPr>
@@ -4620,23 +5085,19 @@
       </p:cxnSp>
       <p:cxnSp>
         <p:nvCxnSpPr>
-          <p:cNvPr id="24" name="Straight Arrow Connector 23"/>
-          <p:cNvCxnSpPr>
-            <a:stCxn id="7" idx="3"/>
-            <a:endCxn id="3" idx="1"/>
-          </p:cNvCxnSpPr>
+          <p:cNvPr id="52" name="Straight Arrow Connector 51"/>
+          <p:cNvCxnSpPr/>
           <p:nvPr/>
         </p:nvCxnSpPr>
         <p:spPr>
-          <a:xfrm>
-            <a:off x="2626995" y="3214370"/>
-            <a:ext cx="652145" cy="214630"/>
+          <a:xfrm flipH="1" flipV="1">
+            <a:off x="9258300" y="2546350"/>
+            <a:ext cx="14605" cy="375285"/>
           </a:xfrm>
           <a:prstGeom prst="straightConnector1">
             <a:avLst/>
           </a:prstGeom>
           <a:ln>
-            <a:headEnd type="arrow" w="med" len="med"/>
             <a:tailEnd type="arrow" w="med" len="med"/>
           </a:ln>
         </p:spPr>
@@ -4655,537 +5116,15 @@
           </a:fontRef>
         </p:style>
       </p:cxnSp>
-      <p:cxnSp>
-        <p:nvCxnSpPr>
-          <p:cNvPr id="25" name="Straight Arrow Connector 24"/>
-          <p:cNvCxnSpPr/>
-          <p:nvPr/>
-        </p:nvCxnSpPr>
-        <p:spPr>
-          <a:xfrm flipH="1" flipV="1">
-            <a:off x="5382260" y="3598545"/>
-            <a:ext cx="642620" cy="635635"/>
-          </a:xfrm>
-          <a:prstGeom prst="straightConnector1">
-            <a:avLst/>
-          </a:prstGeom>
-          <a:ln>
-            <a:headEnd type="arrow" w="med" len="med"/>
-            <a:tailEnd type="arrow" w="med" len="med"/>
-          </a:ln>
-        </p:spPr>
-        <p:style>
-          <a:lnRef idx="3">
-            <a:schemeClr val="accent4"/>
-          </a:lnRef>
-          <a:fillRef idx="0">
-            <a:schemeClr val="accent4"/>
-          </a:fillRef>
-          <a:effectRef idx="2">
-            <a:schemeClr val="accent4"/>
-          </a:effectRef>
-          <a:fontRef idx="minor">
-            <a:schemeClr val="tx1"/>
-          </a:fontRef>
-        </p:style>
-      </p:cxnSp>
-      <p:cxnSp>
-        <p:nvCxnSpPr>
-          <p:cNvPr id="26" name="Straight Arrow Connector 25"/>
-          <p:cNvCxnSpPr>
-            <a:stCxn id="14" idx="2"/>
-            <a:endCxn id="13" idx="0"/>
-          </p:cNvCxnSpPr>
-          <p:nvPr/>
-        </p:nvCxnSpPr>
-        <p:spPr>
-          <a:xfrm>
-            <a:off x="9350375" y="2572385"/>
-            <a:ext cx="0" cy="374015"/>
-          </a:xfrm>
-          <a:prstGeom prst="straightConnector1">
-            <a:avLst/>
-          </a:prstGeom>
-          <a:ln>
-            <a:headEnd type="arrow" w="med" len="med"/>
-            <a:tailEnd type="arrow" w="med" len="med"/>
-          </a:ln>
-        </p:spPr>
-        <p:style>
-          <a:lnRef idx="3">
-            <a:schemeClr val="accent4"/>
-          </a:lnRef>
-          <a:fillRef idx="0">
-            <a:schemeClr val="accent4"/>
-          </a:fillRef>
-          <a:effectRef idx="2">
-            <a:schemeClr val="accent4"/>
-          </a:effectRef>
-          <a:fontRef idx="minor">
-            <a:schemeClr val="tx1"/>
-          </a:fontRef>
-        </p:style>
-      </p:cxnSp>
-      <p:sp>
-        <p:nvSpPr>
-          <p:cNvPr id="27" name="Text Box 26"/>
-          <p:cNvSpPr txBox="1"/>
-          <p:nvPr/>
-        </p:nvSpPr>
-        <p:spPr>
-          <a:xfrm>
-            <a:off x="1234440" y="3043555"/>
-            <a:ext cx="1334135" cy="337185"/>
-          </a:xfrm>
-          <a:prstGeom prst="rect">
-            <a:avLst/>
-          </a:prstGeom>
-          <a:noFill/>
-        </p:spPr>
-        <p:txBody>
-          <a:bodyPr wrap="square" rtlCol="0">
-            <a:spAutoFit/>
-          </a:bodyPr>
-          <a:p>
-            <a:r>
-              <a:rPr lang="en-GB" altLang="en-US" sz="1600"/>
-              <a:t>ESP Module</a:t>
-            </a:r>
-            <a:endParaRPr lang="en-GB" altLang="en-US" sz="1600"/>
-          </a:p>
-        </p:txBody>
-      </p:sp>
-      <p:sp>
-        <p:nvSpPr>
-          <p:cNvPr id="29" name="Text Box 28"/>
-          <p:cNvSpPr txBox="1"/>
-          <p:nvPr/>
-        </p:nvSpPr>
-        <p:spPr>
-          <a:xfrm>
-            <a:off x="2110740" y="1826260"/>
-            <a:ext cx="1344295" cy="583565"/>
-          </a:xfrm>
-          <a:prstGeom prst="rect">
-            <a:avLst/>
-          </a:prstGeom>
-          <a:noFill/>
-        </p:spPr>
-        <p:txBody>
-          <a:bodyPr wrap="square" rtlCol="0">
-            <a:spAutoFit/>
-          </a:bodyPr>
-          <a:p>
-            <a:r>
-              <a:rPr lang="en-GB" altLang="en-US" sz="1600"/>
-              <a:t>Moisture</a:t>
-            </a:r>
-            <a:endParaRPr lang="en-GB" altLang="en-US" sz="1600"/>
-          </a:p>
-          <a:p>
-            <a:r>
-              <a:rPr lang="en-GB" altLang="en-US" sz="1600"/>
-              <a:t>sensor</a:t>
-            </a:r>
-            <a:endParaRPr lang="en-GB" altLang="en-US" sz="1600"/>
-          </a:p>
-        </p:txBody>
-      </p:sp>
-      <p:sp>
-        <p:nvSpPr>
-          <p:cNvPr id="30" name="Text Box 29"/>
-          <p:cNvSpPr txBox="1"/>
-          <p:nvPr/>
-        </p:nvSpPr>
-        <p:spPr>
-          <a:xfrm>
-            <a:off x="3552190" y="1767840"/>
-            <a:ext cx="1762125" cy="521970"/>
-          </a:xfrm>
-          <a:prstGeom prst="rect">
-            <a:avLst/>
-          </a:prstGeom>
-          <a:noFill/>
-        </p:spPr>
-        <p:txBody>
-          <a:bodyPr wrap="square" rtlCol="0">
-            <a:spAutoFit/>
-          </a:bodyPr>
-          <a:p>
-            <a:r>
-              <a:rPr lang="en-GB" altLang="en-US" sz="1400"/>
-              <a:t>Temp &amp; Humidity sensor</a:t>
-            </a:r>
-            <a:endParaRPr lang="en-GB" altLang="en-US" sz="1400"/>
-          </a:p>
-        </p:txBody>
-      </p:sp>
-      <p:sp>
-        <p:nvSpPr>
-          <p:cNvPr id="31" name="Text Box 30"/>
-          <p:cNvSpPr txBox="1"/>
-          <p:nvPr/>
-        </p:nvSpPr>
-        <p:spPr>
-          <a:xfrm>
-            <a:off x="5357495" y="1910080"/>
-            <a:ext cx="1363980" cy="337185"/>
-          </a:xfrm>
-          <a:prstGeom prst="rect">
-            <a:avLst/>
-          </a:prstGeom>
-          <a:noFill/>
-        </p:spPr>
-        <p:txBody>
-          <a:bodyPr wrap="square" rtlCol="0">
-            <a:spAutoFit/>
-          </a:bodyPr>
-          <a:p>
-            <a:r>
-              <a:rPr lang="en-GB" altLang="en-US" sz="1600"/>
-              <a:t>Light sensor</a:t>
-            </a:r>
-            <a:endParaRPr lang="en-GB" altLang="en-US" sz="1600"/>
-          </a:p>
-        </p:txBody>
-      </p:sp>
-      <p:sp>
-        <p:nvSpPr>
-          <p:cNvPr id="32" name="Text Box 31"/>
-          <p:cNvSpPr txBox="1"/>
-          <p:nvPr/>
-        </p:nvSpPr>
-        <p:spPr>
-          <a:xfrm>
-            <a:off x="6190615" y="3042920"/>
-            <a:ext cx="1421765" cy="337185"/>
-          </a:xfrm>
-          <a:prstGeom prst="rect">
-            <a:avLst/>
-          </a:prstGeom>
-          <a:noFill/>
-        </p:spPr>
-        <p:txBody>
-          <a:bodyPr wrap="square" rtlCol="0">
-            <a:spAutoFit/>
-          </a:bodyPr>
-          <a:p>
-            <a:r>
-              <a:rPr lang="en-GB" altLang="en-US" sz="1600"/>
-              <a:t>Camera</a:t>
-            </a:r>
-            <a:endParaRPr lang="en-GB" altLang="en-US" sz="1600"/>
-          </a:p>
-        </p:txBody>
-      </p:sp>
-      <p:sp>
-        <p:nvSpPr>
-          <p:cNvPr id="33" name="Text Box 32"/>
-          <p:cNvSpPr txBox="1"/>
-          <p:nvPr/>
-        </p:nvSpPr>
-        <p:spPr>
-          <a:xfrm>
-            <a:off x="6141720" y="3926840"/>
-            <a:ext cx="1217295" cy="583565"/>
-          </a:xfrm>
-          <a:prstGeom prst="rect">
-            <a:avLst/>
-          </a:prstGeom>
-          <a:noFill/>
-        </p:spPr>
-        <p:txBody>
-          <a:bodyPr wrap="square" rtlCol="0">
-            <a:spAutoFit/>
-          </a:bodyPr>
-          <a:p>
-            <a:r>
-              <a:rPr lang="en-GB" altLang="en-US" sz="1600"/>
-              <a:t>Bluetooth</a:t>
-            </a:r>
-            <a:endParaRPr lang="en-GB" altLang="en-US" sz="1600"/>
-          </a:p>
-          <a:p>
-            <a:r>
-              <a:rPr lang="en-GB" altLang="en-US" sz="1600"/>
-              <a:t>Module</a:t>
-            </a:r>
-            <a:endParaRPr lang="en-GB" altLang="en-US" sz="1600"/>
-          </a:p>
-        </p:txBody>
-      </p:sp>
-      <p:sp>
-        <p:nvSpPr>
-          <p:cNvPr id="34" name="Text Box 33"/>
-          <p:cNvSpPr txBox="1"/>
-          <p:nvPr/>
-        </p:nvSpPr>
-        <p:spPr>
-          <a:xfrm>
-            <a:off x="3735705" y="4502150"/>
-            <a:ext cx="1315720" cy="583565"/>
-          </a:xfrm>
-          <a:prstGeom prst="rect">
-            <a:avLst/>
-          </a:prstGeom>
-          <a:noFill/>
-        </p:spPr>
-        <p:txBody>
-          <a:bodyPr wrap="square" rtlCol="0">
-            <a:spAutoFit/>
-          </a:bodyPr>
-          <a:p>
-            <a:r>
-              <a:rPr lang="en-GB" altLang="en-US" sz="1600"/>
-              <a:t>Motor controller</a:t>
-            </a:r>
-            <a:endParaRPr lang="en-GB" altLang="en-US" sz="1600"/>
-          </a:p>
-        </p:txBody>
-      </p:sp>
-      <p:sp>
-        <p:nvSpPr>
-          <p:cNvPr id="35" name="Text Box 34"/>
-          <p:cNvSpPr txBox="1"/>
-          <p:nvPr/>
-        </p:nvSpPr>
-        <p:spPr>
-          <a:xfrm>
-            <a:off x="3814445" y="5776595"/>
-            <a:ext cx="1460500" cy="337185"/>
-          </a:xfrm>
-          <a:prstGeom prst="rect">
-            <a:avLst/>
-          </a:prstGeom>
-          <a:noFill/>
-        </p:spPr>
-        <p:txBody>
-          <a:bodyPr wrap="square" rtlCol="0">
-            <a:spAutoFit/>
-          </a:bodyPr>
-          <a:p>
-            <a:r>
-              <a:rPr lang="en-GB" altLang="en-US" sz="1600"/>
-              <a:t>Motors</a:t>
-            </a:r>
-            <a:endParaRPr lang="en-GB" altLang="en-US" sz="1600"/>
-          </a:p>
-        </p:txBody>
-      </p:sp>
-      <p:sp>
-        <p:nvSpPr>
-          <p:cNvPr id="36" name="Text Box 35"/>
-          <p:cNvSpPr txBox="1"/>
-          <p:nvPr/>
-        </p:nvSpPr>
-        <p:spPr>
-          <a:xfrm>
-            <a:off x="3970020" y="3186430"/>
-            <a:ext cx="1363345" cy="460375"/>
-          </a:xfrm>
-          <a:prstGeom prst="rect">
-            <a:avLst/>
-          </a:prstGeom>
-          <a:noFill/>
-        </p:spPr>
-        <p:txBody>
-          <a:bodyPr wrap="square" rtlCol="0">
-            <a:spAutoFit/>
-          </a:bodyPr>
-          <a:p>
-            <a:r>
-              <a:rPr lang="en-GB" altLang="en-US" sz="2400">
-                <a:latin typeface="Arial" panose="020B0604020202020204" pitchFamily="34" charset="0"/>
-                <a:cs typeface="Arial" panose="020B0604020202020204" pitchFamily="34" charset="0"/>
-              </a:rPr>
-              <a:t>µC</a:t>
-            </a:r>
-            <a:endParaRPr lang="en-GB" altLang="en-US" sz="2400">
-              <a:latin typeface="Arial" panose="020B0604020202020204" pitchFamily="34" charset="0"/>
-              <a:cs typeface="Arial" panose="020B0604020202020204" pitchFamily="34" charset="0"/>
-            </a:endParaRPr>
-          </a:p>
-        </p:txBody>
-      </p:sp>
-      <p:sp>
-        <p:nvSpPr>
-          <p:cNvPr id="41" name="Text Box 40"/>
-          <p:cNvSpPr txBox="1"/>
-          <p:nvPr/>
-        </p:nvSpPr>
-        <p:spPr>
-          <a:xfrm>
-            <a:off x="8742045" y="1988820"/>
-            <a:ext cx="1217295" cy="583565"/>
-          </a:xfrm>
-          <a:prstGeom prst="rect">
-            <a:avLst/>
-          </a:prstGeom>
-          <a:noFill/>
-        </p:spPr>
-        <p:txBody>
-          <a:bodyPr wrap="square" rtlCol="0">
-            <a:spAutoFit/>
-          </a:bodyPr>
-          <a:p>
-            <a:r>
-              <a:rPr lang="en-GB" altLang="en-US" sz="1600"/>
-              <a:t>Bluetooth</a:t>
-            </a:r>
-            <a:endParaRPr lang="en-GB" altLang="en-US" sz="1600"/>
-          </a:p>
-          <a:p>
-            <a:r>
-              <a:rPr lang="en-GB" altLang="en-US" sz="1600"/>
-              <a:t>Module</a:t>
-            </a:r>
-            <a:endParaRPr lang="en-GB" altLang="en-US" sz="1600"/>
-          </a:p>
-        </p:txBody>
-      </p:sp>
-      <p:sp>
-        <p:nvSpPr>
-          <p:cNvPr id="43" name="Text Box 42"/>
-          <p:cNvSpPr txBox="1"/>
-          <p:nvPr/>
-        </p:nvSpPr>
-        <p:spPr>
-          <a:xfrm>
-            <a:off x="9023985" y="3081655"/>
-            <a:ext cx="1363345" cy="460375"/>
-          </a:xfrm>
-          <a:prstGeom prst="rect">
-            <a:avLst/>
-          </a:prstGeom>
-          <a:noFill/>
-        </p:spPr>
-        <p:txBody>
-          <a:bodyPr wrap="square" rtlCol="0">
-            <a:spAutoFit/>
-          </a:bodyPr>
-          <a:p>
-            <a:r>
-              <a:rPr lang="en-GB" altLang="en-US" sz="2400">
-                <a:latin typeface="Arial" panose="020B0604020202020204" pitchFamily="34" charset="0"/>
-                <a:cs typeface="Arial" panose="020B0604020202020204" pitchFamily="34" charset="0"/>
-              </a:rPr>
-              <a:t>µC</a:t>
-            </a:r>
-            <a:endParaRPr lang="en-GB" altLang="en-US" sz="2400">
-              <a:latin typeface="Arial" panose="020B0604020202020204" pitchFamily="34" charset="0"/>
-              <a:cs typeface="Arial" panose="020B0604020202020204" pitchFamily="34" charset="0"/>
-            </a:endParaRPr>
-          </a:p>
-        </p:txBody>
-      </p:sp>
-      <p:sp>
-        <p:nvSpPr>
-          <p:cNvPr id="44" name="Text Box 43"/>
-          <p:cNvSpPr txBox="1"/>
-          <p:nvPr/>
-        </p:nvSpPr>
-        <p:spPr>
-          <a:xfrm>
-            <a:off x="8663940" y="4114800"/>
-            <a:ext cx="1421765" cy="337185"/>
-          </a:xfrm>
-          <a:prstGeom prst="rect">
-            <a:avLst/>
-          </a:prstGeom>
-          <a:noFill/>
-        </p:spPr>
-        <p:txBody>
-          <a:bodyPr wrap="square" rtlCol="0">
-            <a:spAutoFit/>
-          </a:bodyPr>
-          <a:p>
-            <a:r>
-              <a:rPr lang="en-GB" altLang="en-US" sz="1600"/>
-              <a:t>Water pump</a:t>
-            </a:r>
-            <a:endParaRPr lang="en-GB" altLang="en-US" sz="1600"/>
-          </a:p>
-        </p:txBody>
-      </p:sp>
-      <p:sp>
-        <p:nvSpPr>
-          <p:cNvPr id="45" name="Text Box 44"/>
-          <p:cNvSpPr txBox="1"/>
-          <p:nvPr/>
-        </p:nvSpPr>
-        <p:spPr>
-          <a:xfrm>
-            <a:off x="8839200" y="4961890"/>
-            <a:ext cx="1412240" cy="583565"/>
-          </a:xfrm>
-          <a:prstGeom prst="rect">
-            <a:avLst/>
-          </a:prstGeom>
-          <a:noFill/>
-        </p:spPr>
-        <p:txBody>
-          <a:bodyPr wrap="square" rtlCol="0">
-            <a:spAutoFit/>
-          </a:bodyPr>
-          <a:p>
-            <a:r>
-              <a:rPr lang="en-GB" altLang="en-US" sz="1600"/>
-              <a:t>Irrigation System</a:t>
-            </a:r>
-            <a:endParaRPr lang="en-GB" altLang="en-US" sz="1600"/>
-          </a:p>
-        </p:txBody>
-      </p:sp>
-      <p:cxnSp>
-        <p:nvCxnSpPr>
-          <p:cNvPr id="46" name="Straight Connector 45"/>
-          <p:cNvCxnSpPr>
-            <a:stCxn id="11" idx="3"/>
-            <a:endCxn id="14" idx="1"/>
-          </p:cNvCxnSpPr>
-          <p:nvPr/>
-        </p:nvCxnSpPr>
-        <p:spPr>
-          <a:xfrm flipV="1">
-            <a:off x="7475855" y="2304415"/>
-            <a:ext cx="1148715" cy="1874520"/>
-          </a:xfrm>
-          <a:prstGeom prst="line">
-            <a:avLst/>
-          </a:prstGeom>
-          <a:ln w="12700" cmpd="sng">
-            <a:solidFill>
-              <a:schemeClr val="accent1">
-                <a:shade val="50000"/>
-              </a:schemeClr>
-            </a:solidFill>
-            <a:prstDash val="dashDot"/>
-          </a:ln>
-        </p:spPr>
-        <p:style>
-          <a:lnRef idx="1">
-            <a:schemeClr val="accent1"/>
-          </a:lnRef>
-          <a:fillRef idx="0">
-            <a:schemeClr val="accent1"/>
-          </a:fillRef>
-          <a:effectRef idx="0">
-            <a:schemeClr val="accent1"/>
-          </a:effectRef>
-          <a:fontRef idx="minor">
-            <a:schemeClr val="tx1"/>
-          </a:fontRef>
-        </p:style>
-      </p:cxnSp>
-      <p:sp>
-        <p:nvSpPr>
-          <p:cNvPr id="28" name="Rounded Rectangle 27"/>
+      <p:sp>
+        <p:nvSpPr>
+          <p:cNvPr id="53" name="Rounded Rectangle 52"/>
           <p:cNvSpPr/>
           <p:nvPr/>
         </p:nvSpPr>
         <p:spPr>
           <a:xfrm>
-            <a:off x="10387330" y="3042920"/>
+            <a:off x="10549255" y="3018790"/>
             <a:ext cx="1450975" cy="535940"/>
           </a:xfrm>
           <a:prstGeom prst="roundRect">
@@ -5219,14 +5158,14 @@
       </p:sp>
       <p:sp>
         <p:nvSpPr>
-          <p:cNvPr id="37" name="Text Box 36"/>
+          <p:cNvPr id="54" name="Text Box 53"/>
           <p:cNvSpPr txBox="1"/>
           <p:nvPr/>
         </p:nvSpPr>
         <p:spPr>
           <a:xfrm>
-            <a:off x="10504805" y="2995295"/>
-            <a:ext cx="1217295" cy="583565"/>
+            <a:off x="10654030" y="3102610"/>
+            <a:ext cx="1315720" cy="368300"/>
           </a:xfrm>
           <a:prstGeom prst="rect">
             <a:avLst/>
@@ -5239,30 +5178,29 @@
           </a:bodyPr>
           <a:p>
             <a:r>
-              <a:rPr lang="en-GB" altLang="en-US" sz="1600"/>
-              <a:t>Water level sensor</a:t>
-            </a:r>
-            <a:endParaRPr lang="en-GB" altLang="en-US" sz="1600"/>
+              <a:rPr lang="en-GB" altLang="en-US" b="1"/>
+              <a:t>IOT</a:t>
+            </a:r>
+            <a:endParaRPr lang="en-GB" altLang="en-US" b="1"/>
           </a:p>
         </p:txBody>
       </p:sp>
       <p:cxnSp>
         <p:nvCxnSpPr>
-          <p:cNvPr id="39" name="Straight Arrow Connector 38"/>
-          <p:cNvCxnSpPr>
-            <a:stCxn id="28" idx="1"/>
-          </p:cNvCxnSpPr>
+          <p:cNvPr id="55" name="Straight Arrow Connector 54"/>
+          <p:cNvCxnSpPr/>
           <p:nvPr/>
         </p:nvCxnSpPr>
         <p:spPr>
-          <a:xfrm flipH="1" flipV="1">
-            <a:off x="9938385" y="3298825"/>
-            <a:ext cx="448945" cy="12065"/>
+          <a:xfrm flipH="1">
+            <a:off x="9959340" y="3286760"/>
+            <a:ext cx="584835" cy="0"/>
           </a:xfrm>
           <a:prstGeom prst="straightConnector1">
             <a:avLst/>
           </a:prstGeom>
           <a:ln>
+            <a:headEnd type="arrow" w="med" len="med"/>
             <a:tailEnd type="arrow" w="med" len="med"/>
           </a:ln>
         </p:spPr>
@@ -5281,6 +5219,180 @@
           </a:fontRef>
         </p:style>
       </p:cxnSp>
+      <p:sp>
+        <p:nvSpPr>
+          <p:cNvPr id="59" name="Rounded Rectangle 58"/>
+          <p:cNvSpPr/>
+          <p:nvPr/>
+        </p:nvSpPr>
+        <p:spPr>
+          <a:xfrm>
+            <a:off x="6073775" y="4782820"/>
+            <a:ext cx="1450975" cy="535940"/>
+          </a:xfrm>
+          <a:prstGeom prst="roundRect">
+            <a:avLst/>
+          </a:prstGeom>
+          <a:noFill/>
+        </p:spPr>
+        <p:style>
+          <a:lnRef idx="2">
+            <a:schemeClr val="accent1">
+              <a:shade val="50000"/>
+            </a:schemeClr>
+          </a:lnRef>
+          <a:fillRef idx="1">
+            <a:schemeClr val="accent1"/>
+          </a:fillRef>
+          <a:effectRef idx="0">
+            <a:schemeClr val="accent1"/>
+          </a:effectRef>
+          <a:fontRef idx="minor">
+            <a:schemeClr val="lt1"/>
+          </a:fontRef>
+        </p:style>
+        <p:txBody>
+          <a:bodyPr rtlCol="0" anchor="ctr"/>
+          <a:p>
+            <a:pPr algn="ctr"/>
+            <a:endParaRPr lang="en-US"/>
+          </a:p>
+        </p:txBody>
+      </p:sp>
+      <p:sp>
+        <p:nvSpPr>
+          <p:cNvPr id="60" name="Text Box 59"/>
+          <p:cNvSpPr txBox="1"/>
+          <p:nvPr/>
+        </p:nvSpPr>
+        <p:spPr>
+          <a:xfrm>
+            <a:off x="6447790" y="4866640"/>
+            <a:ext cx="1315720" cy="368300"/>
+          </a:xfrm>
+          <a:prstGeom prst="rect">
+            <a:avLst/>
+          </a:prstGeom>
+          <a:noFill/>
+        </p:spPr>
+        <p:txBody>
+          <a:bodyPr wrap="square" rtlCol="0">
+            <a:spAutoFit/>
+          </a:bodyPr>
+          <a:p>
+            <a:r>
+              <a:rPr lang="en-GB" altLang="en-US" b="1"/>
+              <a:t>IOT</a:t>
+            </a:r>
+            <a:endParaRPr lang="en-GB" altLang="en-US" b="1"/>
+          </a:p>
+        </p:txBody>
+      </p:sp>
+      <p:cxnSp>
+        <p:nvCxnSpPr>
+          <p:cNvPr id="61" name="Straight Arrow Connector 60"/>
+          <p:cNvCxnSpPr>
+            <a:endCxn id="59" idx="2"/>
+          </p:cNvCxnSpPr>
+          <p:nvPr/>
+        </p:nvCxnSpPr>
+        <p:spPr>
+          <a:xfrm flipH="1" flipV="1">
+            <a:off x="6799580" y="5318760"/>
+            <a:ext cx="14605" cy="543560"/>
+          </a:xfrm>
+          <a:prstGeom prst="straightConnector1">
+            <a:avLst/>
+          </a:prstGeom>
+          <a:ln>
+            <a:headEnd type="arrow" w="med" len="med"/>
+            <a:tailEnd type="arrow" w="med" len="med"/>
+          </a:ln>
+        </p:spPr>
+        <p:style>
+          <a:lnRef idx="3">
+            <a:schemeClr val="accent4"/>
+          </a:lnRef>
+          <a:fillRef idx="0">
+            <a:schemeClr val="accent4"/>
+          </a:fillRef>
+          <a:effectRef idx="2">
+            <a:schemeClr val="accent4"/>
+          </a:effectRef>
+          <a:fontRef idx="minor">
+            <a:schemeClr val="tx1"/>
+          </a:fontRef>
+        </p:style>
+      </p:cxnSp>
+      <p:sp>
+        <p:nvSpPr>
+          <p:cNvPr id="62" name="Rounded Rectangle 61"/>
+          <p:cNvSpPr/>
+          <p:nvPr/>
+        </p:nvSpPr>
+        <p:spPr>
+          <a:xfrm>
+            <a:off x="6081395" y="5862320"/>
+            <a:ext cx="1450975" cy="535940"/>
+          </a:xfrm>
+          <a:prstGeom prst="roundRect">
+            <a:avLst/>
+          </a:prstGeom>
+          <a:noFill/>
+        </p:spPr>
+        <p:style>
+          <a:lnRef idx="2">
+            <a:schemeClr val="accent1">
+              <a:shade val="50000"/>
+            </a:schemeClr>
+          </a:lnRef>
+          <a:fillRef idx="1">
+            <a:schemeClr val="accent1"/>
+          </a:fillRef>
+          <a:effectRef idx="0">
+            <a:schemeClr val="accent1"/>
+          </a:effectRef>
+          <a:fontRef idx="minor">
+            <a:schemeClr val="lt1"/>
+          </a:fontRef>
+        </p:style>
+        <p:txBody>
+          <a:bodyPr rtlCol="0" anchor="ctr"/>
+          <a:p>
+            <a:pPr algn="ctr"/>
+            <a:endParaRPr lang="en-US"/>
+          </a:p>
+        </p:txBody>
+      </p:sp>
+      <p:sp>
+        <p:nvSpPr>
+          <p:cNvPr id="63" name="Text Box 62"/>
+          <p:cNvSpPr txBox="1"/>
+          <p:nvPr/>
+        </p:nvSpPr>
+        <p:spPr>
+          <a:xfrm>
+            <a:off x="6190615" y="5946140"/>
+            <a:ext cx="1148080" cy="368300"/>
+          </a:xfrm>
+          <a:prstGeom prst="rect">
+            <a:avLst/>
+          </a:prstGeom>
+          <a:noFill/>
+        </p:spPr>
+        <p:txBody>
+          <a:bodyPr wrap="none" rtlCol="0">
+            <a:spAutoFit/>
+          </a:bodyPr>
+          <a:p>
+            <a:r>
+              <a:rPr lang="en-GB" altLang="en-US"/>
+              <a:t>Mobile UI</a:t>
+            </a:r>
+            <a:endParaRPr lang="en-GB" altLang="en-US"/>
+          </a:p>
+        </p:txBody>
+      </p:sp>
     </p:spTree>
   </p:cSld>
   <p:clrMapOvr>

</xml_diff>